<commit_message>
Update mostly your turn exercises
</commit_message>
<xml_diff>
--- a/final_table_exercises.pptx
+++ b/final_table_exercises.pptx
@@ -2239,7 +2239,7 @@
                 <a:gridCol w="578583"/>
                 <a:gridCol w="578583"/>
               </a:tblGrid>
-              <a:tr h="462026">
+              <a:tr h="472295">
                 <a:tc gridSpan="7">
                   <a:txBody>
                     <a:bodyPr/>
@@ -2269,7 +2269,7 @@
                           <a:ea typeface="Source Sans Pro"/>
                           <a:sym typeface="Source Sans Pro"/>
                         </a:rPr>
-                        <a:t>Data is courtesy of the {gapminder} R package</a:t>
+                        <a:t>Life expectancties over time</a:t>
                       </a:r>
                     </a:p>
                   </a:txBody>
@@ -2330,7 +2330,7 @@
                           <a:ea typeface="Source Sans Pro"/>
                           <a:sym typeface="Source Sans Pro"/>
                         </a:rPr>
-                        <a:t>Data is courtesy of the {gapminder} R package</a:t>
+                        <a:t>Life expectancties over time</a:t>
                       </a:r>
                     </a:p>
                   </a:txBody>
@@ -2391,7 +2391,7 @@
                           <a:ea typeface="Source Sans Pro"/>
                           <a:sym typeface="Source Sans Pro"/>
                         </a:rPr>
-                        <a:t>Data is courtesy of the {gapminder} R package</a:t>
+                        <a:t>Life expectancties over time</a:t>
                       </a:r>
                     </a:p>
                   </a:txBody>
@@ -2452,7 +2452,7 @@
                           <a:ea typeface="Source Sans Pro"/>
                           <a:sym typeface="Source Sans Pro"/>
                         </a:rPr>
-                        <a:t>Data is courtesy of the {gapminder} R package</a:t>
+                        <a:t>Life expectancties over time</a:t>
                       </a:r>
                     </a:p>
                   </a:txBody>
@@ -2513,7 +2513,7 @@
                           <a:ea typeface="Source Sans Pro"/>
                           <a:sym typeface="Source Sans Pro"/>
                         </a:rPr>
-                        <a:t>Data is courtesy of the {gapminder} R package</a:t>
+                        <a:t>Life expectancties over time</a:t>
                       </a:r>
                     </a:p>
                   </a:txBody>
@@ -2574,7 +2574,7 @@
                           <a:ea typeface="Source Sans Pro"/>
                           <a:sym typeface="Source Sans Pro"/>
                         </a:rPr>
-                        <a:t>Data is courtesy of the {gapminder} R package</a:t>
+                        <a:t>Life expectancties over time</a:t>
                       </a:r>
                     </a:p>
                   </a:txBody>
@@ -2635,7 +2635,7 @@
                           <a:ea typeface="Source Sans Pro"/>
                           <a:sym typeface="Source Sans Pro"/>
                         </a:rPr>
-                        <a:t>Data is courtesy of the {gapminder} R package</a:t>
+                        <a:t>Life expectancties over time</a:t>
                       </a:r>
                     </a:p>
                   </a:txBody>
@@ -2668,7 +2668,7 @@
                   </a:tcPr>
                 </a:tc>
               </a:tr>
-              <a:tr h="390241">
+              <a:tr h="391879">
                 <a:tc gridSpan="7">
                   <a:txBody>
                     <a:bodyPr/>
@@ -2698,7 +2698,7 @@
                           <a:ea typeface="Arial"/>
                           <a:sym typeface="Arial"/>
                         </a:rPr>
-                        <a:t>Life expectancties over time</a:t>
+                        <a:t>Data is courtesy of the {gapminder} R package</a:t>
                       </a:r>
                     </a:p>
                   </a:txBody>
@@ -2755,7 +2755,7 @@
                           <a:ea typeface="Arial"/>
                           <a:sym typeface="Arial"/>
                         </a:rPr>
-                        <a:t>Life expectancties over time</a:t>
+                        <a:t>Data is courtesy of the {gapminder} R package</a:t>
                       </a:r>
                     </a:p>
                   </a:txBody>
@@ -2812,7 +2812,7 @@
                           <a:ea typeface="Arial"/>
                           <a:sym typeface="Arial"/>
                         </a:rPr>
-                        <a:t>Life expectancties over time</a:t>
+                        <a:t>Data is courtesy of the {gapminder} R package</a:t>
                       </a:r>
                     </a:p>
                   </a:txBody>
@@ -2869,7 +2869,7 @@
                           <a:ea typeface="Arial"/>
                           <a:sym typeface="Arial"/>
                         </a:rPr>
-                        <a:t>Life expectancties over time</a:t>
+                        <a:t>Data is courtesy of the {gapminder} R package</a:t>
                       </a:r>
                     </a:p>
                   </a:txBody>
@@ -2926,7 +2926,7 @@
                           <a:ea typeface="Arial"/>
                           <a:sym typeface="Arial"/>
                         </a:rPr>
-                        <a:t>Life expectancties over time</a:t>
+                        <a:t>Data is courtesy of the {gapminder} R package</a:t>
                       </a:r>
                     </a:p>
                   </a:txBody>
@@ -2983,7 +2983,7 @@
                           <a:ea typeface="Arial"/>
                           <a:sym typeface="Arial"/>
                         </a:rPr>
-                        <a:t>Life expectancties over time</a:t>
+                        <a:t>Data is courtesy of the {gapminder} R package</a:t>
                       </a:r>
                     </a:p>
                   </a:txBody>
@@ -3040,7 +3040,7 @@
                           <a:ea typeface="Arial"/>
                           <a:sym typeface="Arial"/>
                         </a:rPr>
-                        <a:t>Life expectancties over time</a:t>
+                        <a:t>Data is courtesy of the {gapminder} R package</a:t>
                       </a:r>
                     </a:p>
                   </a:txBody>
@@ -3069,7 +3069,7 @@
                   </a:tcPr>
                 </a:tc>
               </a:tr>
-              <a:tr h="343869">
+              <a:tr h="353667">
                 <a:tc>
                   <a:txBody>
                     <a:bodyPr/>
@@ -3494,7 +3494,7 @@
                   </a:tcPr>
                 </a:tc>
               </a:tr>
-              <a:tr h="352427">
+              <a:tr h="353605">
                 <a:tc>
                   <a:txBody>
                     <a:bodyPr/>
@@ -3541,7 +3541,7 @@
                       <a:noFill/>
                       <a:prstDash val="solid"/>
                     </a:lnT>
-                    <a:lnB algn="ctr" cmpd="sng" cap="flat" w="25400">
+                    <a:lnB algn="ctr" cmpd="sng" cap="flat" w="19050">
                       <a:solidFill>
                         <a:srgbClr val="666666">
                           <a:alpha val="100000"/>
@@ -3602,7 +3602,7 @@
                       <a:noFill/>
                       <a:prstDash val="solid"/>
                     </a:lnT>
-                    <a:lnB algn="ctr" cmpd="sng" cap="flat" w="25400">
+                    <a:lnB algn="ctr" cmpd="sng" cap="flat" w="19050">
                       <a:solidFill>
                         <a:srgbClr val="666666">
                           <a:alpha val="100000"/>
@@ -3663,7 +3663,7 @@
                       <a:noFill/>
                       <a:prstDash val="solid"/>
                     </a:lnT>
-                    <a:lnB algn="ctr" cmpd="sng" cap="flat" w="25400">
+                    <a:lnB algn="ctr" cmpd="sng" cap="flat" w="19050">
                       <a:solidFill>
                         <a:srgbClr val="666666">
                           <a:alpha val="100000"/>
@@ -3724,7 +3724,7 @@
                       <a:noFill/>
                       <a:prstDash val="solid"/>
                     </a:lnT>
-                    <a:lnB algn="ctr" cmpd="sng" cap="flat" w="25400">
+                    <a:lnB algn="ctr" cmpd="sng" cap="flat" w="19050">
                       <a:solidFill>
                         <a:srgbClr val="666666">
                           <a:alpha val="100000"/>
@@ -3785,7 +3785,7 @@
                       <a:noFill/>
                       <a:prstDash val="solid"/>
                     </a:lnT>
-                    <a:lnB algn="ctr" cmpd="sng" cap="flat" w="25400">
+                    <a:lnB algn="ctr" cmpd="sng" cap="flat" w="19050">
                       <a:solidFill>
                         <a:srgbClr val="666666">
                           <a:alpha val="100000"/>
@@ -3846,7 +3846,7 @@
                       <a:noFill/>
                       <a:prstDash val="solid"/>
                     </a:lnT>
-                    <a:lnB algn="ctr" cmpd="sng" cap="flat" w="25400">
+                    <a:lnB algn="ctr" cmpd="sng" cap="flat" w="19050">
                       <a:solidFill>
                         <a:srgbClr val="666666">
                           <a:alpha val="100000"/>
@@ -3907,7 +3907,7 @@
                       <a:noFill/>
                       <a:prstDash val="solid"/>
                     </a:lnT>
-                    <a:lnB algn="ctr" cmpd="sng" cap="flat" w="25400">
+                    <a:lnB algn="ctr" cmpd="sng" cap="flat" w="19050">
                       <a:solidFill>
                         <a:srgbClr val="666666">
                           <a:alpha val="100000"/>
@@ -4352,7 +4352,7 @@
                   </a:tcPr>
                 </a:tc>
               </a:tr>
-              <a:tr h="379960">
+              <a:tr h="378410">
                 <a:tc>
                   <a:txBody>
                     <a:bodyPr/>
@@ -4781,7 +4781,7 @@
                   </a:tcPr>
                 </a:tc>
               </a:tr>
-              <a:tr h="357016">
+              <a:tr h="354783">
                 <a:tc>
                   <a:txBody>
                     <a:bodyPr/>
@@ -5210,7 +5210,7 @@
                   </a:tcPr>
                 </a:tc>
               </a:tr>
-              <a:tr h="379960">
+              <a:tr h="378410">
                 <a:tc>
                   <a:txBody>
                     <a:bodyPr/>
@@ -5639,7 +5639,7 @@
                   </a:tcPr>
                 </a:tc>
               </a:tr>
-              <a:tr h="354101">
+              <a:tr h="353667">
                 <a:tc>
                   <a:txBody>
                     <a:bodyPr/>
@@ -6525,7 +6525,7 @@
                   </a:tcPr>
                 </a:tc>
               </a:tr>
-              <a:tr h="379960">
+              <a:tr h="353605">
                 <a:tc>
                   <a:txBody>
                     <a:bodyPr/>
@@ -6555,7 +6555,7 @@
                           <a:ea typeface="Source Sans Pro"/>
                           <a:sym typeface="Source Sans Pro"/>
                         </a:rPr>
-                        <a:t>Nicaragua</a:t>
+                        <a:t>Jamaica</a:t>
                       </a:r>
                     </a:p>
                   </a:txBody>
@@ -6616,7 +6616,7 @@
                           <a:ea typeface="Source Sans Pro"/>
                           <a:sym typeface="Source Sans Pro"/>
                         </a:rPr>
-                        <a:t>45.43</a:t>
+                        <a:t>62.61</a:t>
                       </a:r>
                     </a:p>
                   </a:txBody>
@@ -6677,7 +6677,7 @@
                           <a:ea typeface="Source Sans Pro"/>
                           <a:sym typeface="Source Sans Pro"/>
                         </a:rPr>
-                        <a:t>51.88</a:t>
+                        <a:t>67.51</a:t>
                       </a:r>
                     </a:p>
                   </a:txBody>
@@ -6738,7 +6738,7 @@
                           <a:ea typeface="Source Sans Pro"/>
                           <a:sym typeface="Source Sans Pro"/>
                         </a:rPr>
-                        <a:t>57.47</a:t>
+                        <a:t>70.11</a:t>
                       </a:r>
                     </a:p>
                   </a:txBody>
@@ -6799,7 +6799,7 @@
                           <a:ea typeface="Source Sans Pro"/>
                           <a:sym typeface="Source Sans Pro"/>
                         </a:rPr>
-                        <a:t>62.01</a:t>
+                        <a:t>71.77</a:t>
                       </a:r>
                     </a:p>
                   </a:txBody>
@@ -6860,7 +6860,7 @@
                           <a:ea typeface="Source Sans Pro"/>
                           <a:sym typeface="Source Sans Pro"/>
                         </a:rPr>
-                        <a:t>68.43</a:t>
+                        <a:t>72.26</a:t>
                       </a:r>
                     </a:p>
                   </a:txBody>
@@ -6921,7 +6921,7 @@
                           <a:ea typeface="Source Sans Pro"/>
                           <a:sym typeface="Source Sans Pro"/>
                         </a:rPr>
-                        <a:t>72.90</a:t>
+                        <a:t>72.57</a:t>
                       </a:r>
                     </a:p>
                   </a:txBody>
@@ -6954,7 +6954,7 @@
                   </a:tcPr>
                 </a:tc>
               </a:tr>
-              <a:tr h="354287">
+              <a:tr h="378410">
                 <a:tc>
                   <a:txBody>
                     <a:bodyPr/>
@@ -6984,7 +6984,7 @@
                           <a:ea typeface="Source Sans Pro"/>
                           <a:sym typeface="Source Sans Pro"/>
                         </a:rPr>
-                        <a:t>Jamaica</a:t>
+                        <a:t>Nicaragua</a:t>
                       </a:r>
                     </a:p>
                   </a:txBody>
@@ -7045,7 +7045,7 @@
                           <a:ea typeface="Source Sans Pro"/>
                           <a:sym typeface="Source Sans Pro"/>
                         </a:rPr>
-                        <a:t>62.61</a:t>
+                        <a:t>45.43</a:t>
                       </a:r>
                     </a:p>
                   </a:txBody>
@@ -7106,7 +7106,7 @@
                           <a:ea typeface="Source Sans Pro"/>
                           <a:sym typeface="Source Sans Pro"/>
                         </a:rPr>
-                        <a:t>67.51</a:t>
+                        <a:t>51.88</a:t>
                       </a:r>
                     </a:p>
                   </a:txBody>
@@ -7167,7 +7167,7 @@
                           <a:ea typeface="Source Sans Pro"/>
                           <a:sym typeface="Source Sans Pro"/>
                         </a:rPr>
-                        <a:t>70.11</a:t>
+                        <a:t>57.47</a:t>
                       </a:r>
                     </a:p>
                   </a:txBody>
@@ -7228,7 +7228,7 @@
                           <a:ea typeface="Source Sans Pro"/>
                           <a:sym typeface="Source Sans Pro"/>
                         </a:rPr>
-                        <a:t>71.77</a:t>
+                        <a:t>62.01</a:t>
                       </a:r>
                     </a:p>
                   </a:txBody>
@@ -7289,7 +7289,7 @@
                           <a:ea typeface="Source Sans Pro"/>
                           <a:sym typeface="Source Sans Pro"/>
                         </a:rPr>
-                        <a:t>72.26</a:t>
+                        <a:t>68.43</a:t>
                       </a:r>
                     </a:p>
                   </a:txBody>
@@ -7350,7 +7350,7 @@
                           <a:ea typeface="Source Sans Pro"/>
                           <a:sym typeface="Source Sans Pro"/>
                         </a:rPr>
-                        <a:t>72.57</a:t>
+                        <a:t>72.90</a:t>
                       </a:r>
                     </a:p>
                   </a:txBody>
@@ -7383,7 +7383,7 @@
                   </a:tcPr>
                 </a:tc>
               </a:tr>
-              <a:tr h="379960">
+              <a:tr h="378410">
                 <a:tc>
                   <a:txBody>
                     <a:bodyPr/>
@@ -7812,7 +7812,7 @@
                   </a:tcPr>
                 </a:tc>
               </a:tr>
-              <a:tr h="354101">
+              <a:tr h="353605">
                 <a:tc>
                   <a:txBody>
                     <a:bodyPr/>
@@ -8698,7 +8698,7 @@
                   </a:tcPr>
                 </a:tc>
               </a:tr>
-              <a:tr h="381572">
+              <a:tr h="379960">
                 <a:tc>
                   <a:txBody>
                     <a:bodyPr/>
@@ -8728,7 +8728,7 @@
                           <a:ea typeface="Source Sans Pro"/>
                           <a:sym typeface="Source Sans Pro"/>
                         </a:rPr>
-                        <a:t>Syria</a:t>
+                        <a:t>Singapore</a:t>
                       </a:r>
                     </a:p>
                   </a:txBody>
@@ -8789,7 +8789,7 @@
                           <a:ea typeface="Source Sans Pro"/>
                           <a:sym typeface="Source Sans Pro"/>
                         </a:rPr>
-                        <a:t>48.28</a:t>
+                        <a:t>63.18</a:t>
                       </a:r>
                     </a:p>
                   </a:txBody>
@@ -8850,7 +8850,7 @@
                           <a:ea typeface="Source Sans Pro"/>
                           <a:sym typeface="Source Sans Pro"/>
                         </a:rPr>
-                        <a:t>53.66</a:t>
+                        <a:t>67.95</a:t>
                       </a:r>
                     </a:p>
                   </a:txBody>
@@ -8911,7 +8911,7 @@
                           <a:ea typeface="Source Sans Pro"/>
                           <a:sym typeface="Source Sans Pro"/>
                         </a:rPr>
-                        <a:t>61.20</a:t>
+                        <a:t>70.80</a:t>
                       </a:r>
                     </a:p>
                   </a:txBody>
@@ -8972,7 +8972,7 @@
                           <a:ea typeface="Source Sans Pro"/>
                           <a:sym typeface="Source Sans Pro"/>
                         </a:rPr>
-                        <a:t>66.97</a:t>
+                        <a:t>73.56</a:t>
                       </a:r>
                     </a:p>
                   </a:txBody>
@@ -9033,7 +9033,7 @@
                           <a:ea typeface="Source Sans Pro"/>
                           <a:sym typeface="Source Sans Pro"/>
                         </a:rPr>
-                        <a:t>71.53</a:t>
+                        <a:t>77.16</a:t>
                       </a:r>
                     </a:p>
                   </a:txBody>
@@ -9094,7 +9094,7 @@
                           <a:ea typeface="Source Sans Pro"/>
                           <a:sym typeface="Source Sans Pro"/>
                         </a:rPr>
-                        <a:t>74.14</a:t>
+                        <a:t>79.97</a:t>
                       </a:r>
                     </a:p>
                   </a:txBody>
@@ -9117,435 +9117,6 @@
                     </a:lnT>
                     <a:lnB algn="ctr" cmpd="sng" cap="flat" w="0">
                       <a:noFill/>
-                      <a:prstDash val="solid"/>
-                    </a:lnB>
-                    <a:solidFill>
-                      <a:srgbClr val="FFFFFF">
-                        <a:alpha val="0"/>
-                      </a:srgbClr>
-                    </a:solidFill>
-                  </a:tcPr>
-                </a:tc>
-              </a:tr>
-              <a:tr h="382440">
-                <a:tc>
-                  <a:txBody>
-                    <a:bodyPr/>
-                    <a:lstStyle/>
-                    <a:p>
-                      <a:pPr algn="l" marL="63500" marR="63500">
-                        <a:lnSpc>
-                          <a:spcPct val="75000"/>
-                        </a:lnSpc>
-                        <a:spcBef>
-                          <a:spcPts val="500"/>
-                        </a:spcBef>
-                        <a:spcAft>
-                          <a:spcPts val="500"/>
-                        </a:spcAft>
-                        <a:buNone/>
-                      </a:pPr>
-                      <a:r>
-                        <a:rPr cap="none" sz="1000" i="0" b="0" u="none">
-                          <a:solidFill>
-                            <a:srgbClr val="000000">
-                              <a:alpha val="100000"/>
-                            </a:srgbClr>
-                          </a:solidFill>
-                          <a:latin typeface="Source Sans Pro"/>
-                          <a:cs typeface="Source Sans Pro"/>
-                          <a:ea typeface="Source Sans Pro"/>
-                          <a:sym typeface="Source Sans Pro"/>
-                        </a:rPr>
-                        <a:t>Singapore</a:t>
-                      </a:r>
-                    </a:p>
-                  </a:txBody>
-                  <a:tcPr anchor="ctr" marB="63500" marT="63500" marR="0" marL="0">
-                    <a:lnL algn="ctr" cmpd="sng" cap="flat" w="0">
-                      <a:noFill/>
-                      <a:prstDash val="solid"/>
-                    </a:lnL>
-                    <a:lnR algn="ctr" cmpd="sng" cap="flat" w="0">
-                      <a:noFill/>
-                      <a:prstDash val="solid"/>
-                    </a:lnR>
-                    <a:lnT algn="ctr" cmpd="sng" cap="flat" w="0">
-                      <a:noFill/>
-                      <a:prstDash val="solid"/>
-                    </a:lnT>
-                    <a:lnB algn="ctr" cmpd="sng" cap="flat" w="12700">
-                      <a:solidFill>
-                        <a:srgbClr val="666666">
-                          <a:alpha val="100000"/>
-                        </a:srgbClr>
-                      </a:solidFill>
-                      <a:prstDash val="solid"/>
-                    </a:lnB>
-                    <a:solidFill>
-                      <a:srgbClr val="FFFFFF">
-                        <a:alpha val="0"/>
-                      </a:srgbClr>
-                    </a:solidFill>
-                  </a:tcPr>
-                </a:tc>
-                <a:tc>
-                  <a:txBody>
-                    <a:bodyPr/>
-                    <a:lstStyle/>
-                    <a:p>
-                      <a:pPr algn="r" marL="63500" marR="63500">
-                        <a:lnSpc>
-                          <a:spcPct val="75000"/>
-                        </a:lnSpc>
-                        <a:spcBef>
-                          <a:spcPts val="500"/>
-                        </a:spcBef>
-                        <a:spcAft>
-                          <a:spcPts val="500"/>
-                        </a:spcAft>
-                        <a:buNone/>
-                      </a:pPr>
-                      <a:r>
-                        <a:rPr cap="none" sz="1000" i="0" b="0" u="none">
-                          <a:solidFill>
-                            <a:srgbClr val="000000">
-                              <a:alpha val="100000"/>
-                            </a:srgbClr>
-                          </a:solidFill>
-                          <a:latin typeface="Source Sans Pro"/>
-                          <a:cs typeface="Source Sans Pro"/>
-                          <a:ea typeface="Source Sans Pro"/>
-                          <a:sym typeface="Source Sans Pro"/>
-                        </a:rPr>
-                        <a:t>63.18</a:t>
-                      </a:r>
-                    </a:p>
-                  </a:txBody>
-                  <a:tcPr anchor="ctr" marB="63500" marT="63500" marR="0" marL="0">
-                    <a:lnL algn="ctr" cmpd="sng" cap="flat" w="0">
-                      <a:noFill/>
-                      <a:prstDash val="solid"/>
-                    </a:lnL>
-                    <a:lnR algn="ctr" cmpd="sng" cap="flat" w="0">
-                      <a:noFill/>
-                      <a:prstDash val="solid"/>
-                    </a:lnR>
-                    <a:lnT algn="ctr" cmpd="sng" cap="flat" w="0">
-                      <a:noFill/>
-                      <a:prstDash val="solid"/>
-                    </a:lnT>
-                    <a:lnB algn="ctr" cmpd="sng" cap="flat" w="12700">
-                      <a:solidFill>
-                        <a:srgbClr val="666666">
-                          <a:alpha val="100000"/>
-                        </a:srgbClr>
-                      </a:solidFill>
-                      <a:prstDash val="solid"/>
-                    </a:lnB>
-                    <a:solidFill>
-                      <a:srgbClr val="FFFFFF">
-                        <a:alpha val="0"/>
-                      </a:srgbClr>
-                    </a:solidFill>
-                  </a:tcPr>
-                </a:tc>
-                <a:tc>
-                  <a:txBody>
-                    <a:bodyPr/>
-                    <a:lstStyle/>
-                    <a:p>
-                      <a:pPr algn="r" marL="63500" marR="63500">
-                        <a:lnSpc>
-                          <a:spcPct val="75000"/>
-                        </a:lnSpc>
-                        <a:spcBef>
-                          <a:spcPts val="500"/>
-                        </a:spcBef>
-                        <a:spcAft>
-                          <a:spcPts val="500"/>
-                        </a:spcAft>
-                        <a:buNone/>
-                      </a:pPr>
-                      <a:r>
-                        <a:rPr cap="none" sz="1000" i="0" b="0" u="none">
-                          <a:solidFill>
-                            <a:srgbClr val="000000">
-                              <a:alpha val="100000"/>
-                            </a:srgbClr>
-                          </a:solidFill>
-                          <a:latin typeface="Source Sans Pro"/>
-                          <a:cs typeface="Source Sans Pro"/>
-                          <a:ea typeface="Source Sans Pro"/>
-                          <a:sym typeface="Source Sans Pro"/>
-                        </a:rPr>
-                        <a:t>67.95</a:t>
-                      </a:r>
-                    </a:p>
-                  </a:txBody>
-                  <a:tcPr anchor="ctr" marB="63500" marT="63500" marR="0" marL="0">
-                    <a:lnL algn="ctr" cmpd="sng" cap="flat" w="0">
-                      <a:noFill/>
-                      <a:prstDash val="solid"/>
-                    </a:lnL>
-                    <a:lnR algn="ctr" cmpd="sng" cap="flat" w="0">
-                      <a:noFill/>
-                      <a:prstDash val="solid"/>
-                    </a:lnR>
-                    <a:lnT algn="ctr" cmpd="sng" cap="flat" w="0">
-                      <a:noFill/>
-                      <a:prstDash val="solid"/>
-                    </a:lnT>
-                    <a:lnB algn="ctr" cmpd="sng" cap="flat" w="12700">
-                      <a:solidFill>
-                        <a:srgbClr val="666666">
-                          <a:alpha val="100000"/>
-                        </a:srgbClr>
-                      </a:solidFill>
-                      <a:prstDash val="solid"/>
-                    </a:lnB>
-                    <a:solidFill>
-                      <a:srgbClr val="FFFFFF">
-                        <a:alpha val="0"/>
-                      </a:srgbClr>
-                    </a:solidFill>
-                  </a:tcPr>
-                </a:tc>
-                <a:tc>
-                  <a:txBody>
-                    <a:bodyPr/>
-                    <a:lstStyle/>
-                    <a:p>
-                      <a:pPr algn="r" marL="63500" marR="63500">
-                        <a:lnSpc>
-                          <a:spcPct val="75000"/>
-                        </a:lnSpc>
-                        <a:spcBef>
-                          <a:spcPts val="500"/>
-                        </a:spcBef>
-                        <a:spcAft>
-                          <a:spcPts val="500"/>
-                        </a:spcAft>
-                        <a:buNone/>
-                      </a:pPr>
-                      <a:r>
-                        <a:rPr cap="none" sz="1000" i="0" b="0" u="none">
-                          <a:solidFill>
-                            <a:srgbClr val="000000">
-                              <a:alpha val="100000"/>
-                            </a:srgbClr>
-                          </a:solidFill>
-                          <a:latin typeface="Source Sans Pro"/>
-                          <a:cs typeface="Source Sans Pro"/>
-                          <a:ea typeface="Source Sans Pro"/>
-                          <a:sym typeface="Source Sans Pro"/>
-                        </a:rPr>
-                        <a:t>70.80</a:t>
-                      </a:r>
-                    </a:p>
-                  </a:txBody>
-                  <a:tcPr anchor="ctr" marB="63500" marT="63500" marR="0" marL="0">
-                    <a:lnL algn="ctr" cmpd="sng" cap="flat" w="0">
-                      <a:noFill/>
-                      <a:prstDash val="solid"/>
-                    </a:lnL>
-                    <a:lnR algn="ctr" cmpd="sng" cap="flat" w="0">
-                      <a:noFill/>
-                      <a:prstDash val="solid"/>
-                    </a:lnR>
-                    <a:lnT algn="ctr" cmpd="sng" cap="flat" w="0">
-                      <a:noFill/>
-                      <a:prstDash val="solid"/>
-                    </a:lnT>
-                    <a:lnB algn="ctr" cmpd="sng" cap="flat" w="12700">
-                      <a:solidFill>
-                        <a:srgbClr val="666666">
-                          <a:alpha val="100000"/>
-                        </a:srgbClr>
-                      </a:solidFill>
-                      <a:prstDash val="solid"/>
-                    </a:lnB>
-                    <a:solidFill>
-                      <a:srgbClr val="FFFFFF">
-                        <a:alpha val="0"/>
-                      </a:srgbClr>
-                    </a:solidFill>
-                  </a:tcPr>
-                </a:tc>
-                <a:tc>
-                  <a:txBody>
-                    <a:bodyPr/>
-                    <a:lstStyle/>
-                    <a:p>
-                      <a:pPr algn="r" marL="63500" marR="63500">
-                        <a:lnSpc>
-                          <a:spcPct val="75000"/>
-                        </a:lnSpc>
-                        <a:spcBef>
-                          <a:spcPts val="500"/>
-                        </a:spcBef>
-                        <a:spcAft>
-                          <a:spcPts val="500"/>
-                        </a:spcAft>
-                        <a:buNone/>
-                      </a:pPr>
-                      <a:r>
-                        <a:rPr cap="none" sz="1000" i="0" b="0" u="none">
-                          <a:solidFill>
-                            <a:srgbClr val="000000">
-                              <a:alpha val="100000"/>
-                            </a:srgbClr>
-                          </a:solidFill>
-                          <a:latin typeface="Source Sans Pro"/>
-                          <a:cs typeface="Source Sans Pro"/>
-                          <a:ea typeface="Source Sans Pro"/>
-                          <a:sym typeface="Source Sans Pro"/>
-                        </a:rPr>
-                        <a:t>73.56</a:t>
-                      </a:r>
-                    </a:p>
-                  </a:txBody>
-                  <a:tcPr anchor="ctr" marB="63500" marT="63500" marR="0" marL="0">
-                    <a:lnL algn="ctr" cmpd="sng" cap="flat" w="0">
-                      <a:noFill/>
-                      <a:prstDash val="solid"/>
-                    </a:lnL>
-                    <a:lnR algn="ctr" cmpd="sng" cap="flat" w="0">
-                      <a:noFill/>
-                      <a:prstDash val="solid"/>
-                    </a:lnR>
-                    <a:lnT algn="ctr" cmpd="sng" cap="flat" w="0">
-                      <a:noFill/>
-                      <a:prstDash val="solid"/>
-                    </a:lnT>
-                    <a:lnB algn="ctr" cmpd="sng" cap="flat" w="12700">
-                      <a:solidFill>
-                        <a:srgbClr val="666666">
-                          <a:alpha val="100000"/>
-                        </a:srgbClr>
-                      </a:solidFill>
-                      <a:prstDash val="solid"/>
-                    </a:lnB>
-                    <a:solidFill>
-                      <a:srgbClr val="FFFFFF">
-                        <a:alpha val="0"/>
-                      </a:srgbClr>
-                    </a:solidFill>
-                  </a:tcPr>
-                </a:tc>
-                <a:tc>
-                  <a:txBody>
-                    <a:bodyPr/>
-                    <a:lstStyle/>
-                    <a:p>
-                      <a:pPr algn="r" marL="63500" marR="63500">
-                        <a:lnSpc>
-                          <a:spcPct val="75000"/>
-                        </a:lnSpc>
-                        <a:spcBef>
-                          <a:spcPts val="500"/>
-                        </a:spcBef>
-                        <a:spcAft>
-                          <a:spcPts val="500"/>
-                        </a:spcAft>
-                        <a:buNone/>
-                      </a:pPr>
-                      <a:r>
-                        <a:rPr cap="none" sz="1000" i="0" b="0" u="none">
-                          <a:solidFill>
-                            <a:srgbClr val="000000">
-                              <a:alpha val="100000"/>
-                            </a:srgbClr>
-                          </a:solidFill>
-                          <a:latin typeface="Source Sans Pro"/>
-                          <a:cs typeface="Source Sans Pro"/>
-                          <a:ea typeface="Source Sans Pro"/>
-                          <a:sym typeface="Source Sans Pro"/>
-                        </a:rPr>
-                        <a:t>77.16</a:t>
-                      </a:r>
-                    </a:p>
-                  </a:txBody>
-                  <a:tcPr anchor="ctr" marB="63500" marT="63500" marR="0" marL="0">
-                    <a:lnL algn="ctr" cmpd="sng" cap="flat" w="0">
-                      <a:noFill/>
-                      <a:prstDash val="solid"/>
-                    </a:lnL>
-                    <a:lnR algn="ctr" cmpd="sng" cap="flat" w="0">
-                      <a:noFill/>
-                      <a:prstDash val="solid"/>
-                    </a:lnR>
-                    <a:lnT algn="ctr" cmpd="sng" cap="flat" w="0">
-                      <a:noFill/>
-                      <a:prstDash val="solid"/>
-                    </a:lnT>
-                    <a:lnB algn="ctr" cmpd="sng" cap="flat" w="12700">
-                      <a:solidFill>
-                        <a:srgbClr val="666666">
-                          <a:alpha val="100000"/>
-                        </a:srgbClr>
-                      </a:solidFill>
-                      <a:prstDash val="solid"/>
-                    </a:lnB>
-                    <a:solidFill>
-                      <a:srgbClr val="FFFFFF">
-                        <a:alpha val="0"/>
-                      </a:srgbClr>
-                    </a:solidFill>
-                  </a:tcPr>
-                </a:tc>
-                <a:tc>
-                  <a:txBody>
-                    <a:bodyPr/>
-                    <a:lstStyle/>
-                    <a:p>
-                      <a:pPr algn="r" marL="63500" marR="63500">
-                        <a:lnSpc>
-                          <a:spcPct val="75000"/>
-                        </a:lnSpc>
-                        <a:spcBef>
-                          <a:spcPts val="500"/>
-                        </a:spcBef>
-                        <a:spcAft>
-                          <a:spcPts val="500"/>
-                        </a:spcAft>
-                        <a:buNone/>
-                      </a:pPr>
-                      <a:r>
-                        <a:rPr cap="none" sz="1000" i="0" b="0" u="none">
-                          <a:solidFill>
-                            <a:srgbClr val="000000">
-                              <a:alpha val="100000"/>
-                            </a:srgbClr>
-                          </a:solidFill>
-                          <a:latin typeface="Source Sans Pro"/>
-                          <a:cs typeface="Source Sans Pro"/>
-                          <a:ea typeface="Source Sans Pro"/>
-                          <a:sym typeface="Source Sans Pro"/>
-                        </a:rPr>
-                        <a:t>79.97</a:t>
-                      </a:r>
-                    </a:p>
-                  </a:txBody>
-                  <a:tcPr anchor="ctr" marB="63500" marT="63500" marR="0" marL="0">
-                    <a:lnL algn="ctr" cmpd="sng" cap="flat" w="0">
-                      <a:noFill/>
-                      <a:prstDash val="solid"/>
-                    </a:lnL>
-                    <a:lnR algn="ctr" cmpd="sng" cap="flat" w="0">
-                      <a:noFill/>
-                      <a:prstDash val="solid"/>
-                    </a:lnR>
-                    <a:lnT algn="ctr" cmpd="sng" cap="flat" w="0">
-                      <a:noFill/>
-                      <a:prstDash val="solid"/>
-                    </a:lnT>
-                    <a:lnB algn="ctr" cmpd="sng" cap="flat" w="12700">
-                      <a:solidFill>
-                        <a:srgbClr val="666666">
-                          <a:alpha val="100000"/>
-                        </a:srgbClr>
-                      </a:solidFill>
                       <a:prstDash val="solid"/>
                     </a:lnB>
                     <a:solidFill>
@@ -9586,6 +9157,435 @@
                           <a:ea typeface="Source Sans Pro"/>
                           <a:sym typeface="Source Sans Pro"/>
                         </a:rPr>
+                        <a:t>Syria</a:t>
+                      </a:r>
+                    </a:p>
+                  </a:txBody>
+                  <a:tcPr anchor="ctr" marB="63500" marT="63500" marR="0" marL="0">
+                    <a:lnL algn="ctr" cmpd="sng" cap="flat" w="0">
+                      <a:noFill/>
+                      <a:prstDash val="solid"/>
+                    </a:lnL>
+                    <a:lnR algn="ctr" cmpd="sng" cap="flat" w="0">
+                      <a:noFill/>
+                      <a:prstDash val="solid"/>
+                    </a:lnR>
+                    <a:lnT algn="ctr" cmpd="sng" cap="flat" w="0">
+                      <a:noFill/>
+                      <a:prstDash val="solid"/>
+                    </a:lnT>
+                    <a:lnB algn="ctr" cmpd="sng" cap="flat" w="12700">
+                      <a:solidFill>
+                        <a:srgbClr val="666666">
+                          <a:alpha val="100000"/>
+                        </a:srgbClr>
+                      </a:solidFill>
+                      <a:prstDash val="solid"/>
+                    </a:lnB>
+                    <a:solidFill>
+                      <a:srgbClr val="FFFFFF">
+                        <a:alpha val="0"/>
+                      </a:srgbClr>
+                    </a:solidFill>
+                  </a:tcPr>
+                </a:tc>
+                <a:tc>
+                  <a:txBody>
+                    <a:bodyPr/>
+                    <a:lstStyle/>
+                    <a:p>
+                      <a:pPr algn="r" marL="63500" marR="63500">
+                        <a:lnSpc>
+                          <a:spcPct val="75000"/>
+                        </a:lnSpc>
+                        <a:spcBef>
+                          <a:spcPts val="500"/>
+                        </a:spcBef>
+                        <a:spcAft>
+                          <a:spcPts val="500"/>
+                        </a:spcAft>
+                        <a:buNone/>
+                      </a:pPr>
+                      <a:r>
+                        <a:rPr cap="none" sz="1000" i="0" b="0" u="none">
+                          <a:solidFill>
+                            <a:srgbClr val="000000">
+                              <a:alpha val="100000"/>
+                            </a:srgbClr>
+                          </a:solidFill>
+                          <a:latin typeface="Source Sans Pro"/>
+                          <a:cs typeface="Source Sans Pro"/>
+                          <a:ea typeface="Source Sans Pro"/>
+                          <a:sym typeface="Source Sans Pro"/>
+                        </a:rPr>
+                        <a:t>48.28</a:t>
+                      </a:r>
+                    </a:p>
+                  </a:txBody>
+                  <a:tcPr anchor="ctr" marB="63500" marT="63500" marR="0" marL="0">
+                    <a:lnL algn="ctr" cmpd="sng" cap="flat" w="0">
+                      <a:noFill/>
+                      <a:prstDash val="solid"/>
+                    </a:lnL>
+                    <a:lnR algn="ctr" cmpd="sng" cap="flat" w="0">
+                      <a:noFill/>
+                      <a:prstDash val="solid"/>
+                    </a:lnR>
+                    <a:lnT algn="ctr" cmpd="sng" cap="flat" w="0">
+                      <a:noFill/>
+                      <a:prstDash val="solid"/>
+                    </a:lnT>
+                    <a:lnB algn="ctr" cmpd="sng" cap="flat" w="12700">
+                      <a:solidFill>
+                        <a:srgbClr val="666666">
+                          <a:alpha val="100000"/>
+                        </a:srgbClr>
+                      </a:solidFill>
+                      <a:prstDash val="solid"/>
+                    </a:lnB>
+                    <a:solidFill>
+                      <a:srgbClr val="FFFFFF">
+                        <a:alpha val="0"/>
+                      </a:srgbClr>
+                    </a:solidFill>
+                  </a:tcPr>
+                </a:tc>
+                <a:tc>
+                  <a:txBody>
+                    <a:bodyPr/>
+                    <a:lstStyle/>
+                    <a:p>
+                      <a:pPr algn="r" marL="63500" marR="63500">
+                        <a:lnSpc>
+                          <a:spcPct val="75000"/>
+                        </a:lnSpc>
+                        <a:spcBef>
+                          <a:spcPts val="500"/>
+                        </a:spcBef>
+                        <a:spcAft>
+                          <a:spcPts val="500"/>
+                        </a:spcAft>
+                        <a:buNone/>
+                      </a:pPr>
+                      <a:r>
+                        <a:rPr cap="none" sz="1000" i="0" b="0" u="none">
+                          <a:solidFill>
+                            <a:srgbClr val="000000">
+                              <a:alpha val="100000"/>
+                            </a:srgbClr>
+                          </a:solidFill>
+                          <a:latin typeface="Source Sans Pro"/>
+                          <a:cs typeface="Source Sans Pro"/>
+                          <a:ea typeface="Source Sans Pro"/>
+                          <a:sym typeface="Source Sans Pro"/>
+                        </a:rPr>
+                        <a:t>53.66</a:t>
+                      </a:r>
+                    </a:p>
+                  </a:txBody>
+                  <a:tcPr anchor="ctr" marB="63500" marT="63500" marR="0" marL="0">
+                    <a:lnL algn="ctr" cmpd="sng" cap="flat" w="0">
+                      <a:noFill/>
+                      <a:prstDash val="solid"/>
+                    </a:lnL>
+                    <a:lnR algn="ctr" cmpd="sng" cap="flat" w="0">
+                      <a:noFill/>
+                      <a:prstDash val="solid"/>
+                    </a:lnR>
+                    <a:lnT algn="ctr" cmpd="sng" cap="flat" w="0">
+                      <a:noFill/>
+                      <a:prstDash val="solid"/>
+                    </a:lnT>
+                    <a:lnB algn="ctr" cmpd="sng" cap="flat" w="12700">
+                      <a:solidFill>
+                        <a:srgbClr val="666666">
+                          <a:alpha val="100000"/>
+                        </a:srgbClr>
+                      </a:solidFill>
+                      <a:prstDash val="solid"/>
+                    </a:lnB>
+                    <a:solidFill>
+                      <a:srgbClr val="FFFFFF">
+                        <a:alpha val="0"/>
+                      </a:srgbClr>
+                    </a:solidFill>
+                  </a:tcPr>
+                </a:tc>
+                <a:tc>
+                  <a:txBody>
+                    <a:bodyPr/>
+                    <a:lstStyle/>
+                    <a:p>
+                      <a:pPr algn="r" marL="63500" marR="63500">
+                        <a:lnSpc>
+                          <a:spcPct val="75000"/>
+                        </a:lnSpc>
+                        <a:spcBef>
+                          <a:spcPts val="500"/>
+                        </a:spcBef>
+                        <a:spcAft>
+                          <a:spcPts val="500"/>
+                        </a:spcAft>
+                        <a:buNone/>
+                      </a:pPr>
+                      <a:r>
+                        <a:rPr cap="none" sz="1000" i="0" b="0" u="none">
+                          <a:solidFill>
+                            <a:srgbClr val="000000">
+                              <a:alpha val="100000"/>
+                            </a:srgbClr>
+                          </a:solidFill>
+                          <a:latin typeface="Source Sans Pro"/>
+                          <a:cs typeface="Source Sans Pro"/>
+                          <a:ea typeface="Source Sans Pro"/>
+                          <a:sym typeface="Source Sans Pro"/>
+                        </a:rPr>
+                        <a:t>61.20</a:t>
+                      </a:r>
+                    </a:p>
+                  </a:txBody>
+                  <a:tcPr anchor="ctr" marB="63500" marT="63500" marR="0" marL="0">
+                    <a:lnL algn="ctr" cmpd="sng" cap="flat" w="0">
+                      <a:noFill/>
+                      <a:prstDash val="solid"/>
+                    </a:lnL>
+                    <a:lnR algn="ctr" cmpd="sng" cap="flat" w="0">
+                      <a:noFill/>
+                      <a:prstDash val="solid"/>
+                    </a:lnR>
+                    <a:lnT algn="ctr" cmpd="sng" cap="flat" w="0">
+                      <a:noFill/>
+                      <a:prstDash val="solid"/>
+                    </a:lnT>
+                    <a:lnB algn="ctr" cmpd="sng" cap="flat" w="12700">
+                      <a:solidFill>
+                        <a:srgbClr val="666666">
+                          <a:alpha val="100000"/>
+                        </a:srgbClr>
+                      </a:solidFill>
+                      <a:prstDash val="solid"/>
+                    </a:lnB>
+                    <a:solidFill>
+                      <a:srgbClr val="FFFFFF">
+                        <a:alpha val="0"/>
+                      </a:srgbClr>
+                    </a:solidFill>
+                  </a:tcPr>
+                </a:tc>
+                <a:tc>
+                  <a:txBody>
+                    <a:bodyPr/>
+                    <a:lstStyle/>
+                    <a:p>
+                      <a:pPr algn="r" marL="63500" marR="63500">
+                        <a:lnSpc>
+                          <a:spcPct val="75000"/>
+                        </a:lnSpc>
+                        <a:spcBef>
+                          <a:spcPts val="500"/>
+                        </a:spcBef>
+                        <a:spcAft>
+                          <a:spcPts val="500"/>
+                        </a:spcAft>
+                        <a:buNone/>
+                      </a:pPr>
+                      <a:r>
+                        <a:rPr cap="none" sz="1000" i="0" b="0" u="none">
+                          <a:solidFill>
+                            <a:srgbClr val="000000">
+                              <a:alpha val="100000"/>
+                            </a:srgbClr>
+                          </a:solidFill>
+                          <a:latin typeface="Source Sans Pro"/>
+                          <a:cs typeface="Source Sans Pro"/>
+                          <a:ea typeface="Source Sans Pro"/>
+                          <a:sym typeface="Source Sans Pro"/>
+                        </a:rPr>
+                        <a:t>66.97</a:t>
+                      </a:r>
+                    </a:p>
+                  </a:txBody>
+                  <a:tcPr anchor="ctr" marB="63500" marT="63500" marR="0" marL="0">
+                    <a:lnL algn="ctr" cmpd="sng" cap="flat" w="0">
+                      <a:noFill/>
+                      <a:prstDash val="solid"/>
+                    </a:lnL>
+                    <a:lnR algn="ctr" cmpd="sng" cap="flat" w="0">
+                      <a:noFill/>
+                      <a:prstDash val="solid"/>
+                    </a:lnR>
+                    <a:lnT algn="ctr" cmpd="sng" cap="flat" w="0">
+                      <a:noFill/>
+                      <a:prstDash val="solid"/>
+                    </a:lnT>
+                    <a:lnB algn="ctr" cmpd="sng" cap="flat" w="12700">
+                      <a:solidFill>
+                        <a:srgbClr val="666666">
+                          <a:alpha val="100000"/>
+                        </a:srgbClr>
+                      </a:solidFill>
+                      <a:prstDash val="solid"/>
+                    </a:lnB>
+                    <a:solidFill>
+                      <a:srgbClr val="FFFFFF">
+                        <a:alpha val="0"/>
+                      </a:srgbClr>
+                    </a:solidFill>
+                  </a:tcPr>
+                </a:tc>
+                <a:tc>
+                  <a:txBody>
+                    <a:bodyPr/>
+                    <a:lstStyle/>
+                    <a:p>
+                      <a:pPr algn="r" marL="63500" marR="63500">
+                        <a:lnSpc>
+                          <a:spcPct val="75000"/>
+                        </a:lnSpc>
+                        <a:spcBef>
+                          <a:spcPts val="500"/>
+                        </a:spcBef>
+                        <a:spcAft>
+                          <a:spcPts val="500"/>
+                        </a:spcAft>
+                        <a:buNone/>
+                      </a:pPr>
+                      <a:r>
+                        <a:rPr cap="none" sz="1000" i="0" b="0" u="none">
+                          <a:solidFill>
+                            <a:srgbClr val="000000">
+                              <a:alpha val="100000"/>
+                            </a:srgbClr>
+                          </a:solidFill>
+                          <a:latin typeface="Source Sans Pro"/>
+                          <a:cs typeface="Source Sans Pro"/>
+                          <a:ea typeface="Source Sans Pro"/>
+                          <a:sym typeface="Source Sans Pro"/>
+                        </a:rPr>
+                        <a:t>71.53</a:t>
+                      </a:r>
+                    </a:p>
+                  </a:txBody>
+                  <a:tcPr anchor="ctr" marB="63500" marT="63500" marR="0" marL="0">
+                    <a:lnL algn="ctr" cmpd="sng" cap="flat" w="0">
+                      <a:noFill/>
+                      <a:prstDash val="solid"/>
+                    </a:lnL>
+                    <a:lnR algn="ctr" cmpd="sng" cap="flat" w="0">
+                      <a:noFill/>
+                      <a:prstDash val="solid"/>
+                    </a:lnR>
+                    <a:lnT algn="ctr" cmpd="sng" cap="flat" w="0">
+                      <a:noFill/>
+                      <a:prstDash val="solid"/>
+                    </a:lnT>
+                    <a:lnB algn="ctr" cmpd="sng" cap="flat" w="12700">
+                      <a:solidFill>
+                        <a:srgbClr val="666666">
+                          <a:alpha val="100000"/>
+                        </a:srgbClr>
+                      </a:solidFill>
+                      <a:prstDash val="solid"/>
+                    </a:lnB>
+                    <a:solidFill>
+                      <a:srgbClr val="FFFFFF">
+                        <a:alpha val="0"/>
+                      </a:srgbClr>
+                    </a:solidFill>
+                  </a:tcPr>
+                </a:tc>
+                <a:tc>
+                  <a:txBody>
+                    <a:bodyPr/>
+                    <a:lstStyle/>
+                    <a:p>
+                      <a:pPr algn="r" marL="63500" marR="63500">
+                        <a:lnSpc>
+                          <a:spcPct val="75000"/>
+                        </a:lnSpc>
+                        <a:spcBef>
+                          <a:spcPts val="500"/>
+                        </a:spcBef>
+                        <a:spcAft>
+                          <a:spcPts val="500"/>
+                        </a:spcAft>
+                        <a:buNone/>
+                      </a:pPr>
+                      <a:r>
+                        <a:rPr cap="none" sz="1000" i="0" b="0" u="none">
+                          <a:solidFill>
+                            <a:srgbClr val="000000">
+                              <a:alpha val="100000"/>
+                            </a:srgbClr>
+                          </a:solidFill>
+                          <a:latin typeface="Source Sans Pro"/>
+                          <a:cs typeface="Source Sans Pro"/>
+                          <a:ea typeface="Source Sans Pro"/>
+                          <a:sym typeface="Source Sans Pro"/>
+                        </a:rPr>
+                        <a:t>74.14</a:t>
+                      </a:r>
+                    </a:p>
+                  </a:txBody>
+                  <a:tcPr anchor="ctr" marB="63500" marT="63500" marR="0" marL="0">
+                    <a:lnL algn="ctr" cmpd="sng" cap="flat" w="0">
+                      <a:noFill/>
+                      <a:prstDash val="solid"/>
+                    </a:lnL>
+                    <a:lnR algn="ctr" cmpd="sng" cap="flat" w="0">
+                      <a:noFill/>
+                      <a:prstDash val="solid"/>
+                    </a:lnR>
+                    <a:lnT algn="ctr" cmpd="sng" cap="flat" w="0">
+                      <a:noFill/>
+                      <a:prstDash val="solid"/>
+                    </a:lnT>
+                    <a:lnB algn="ctr" cmpd="sng" cap="flat" w="12700">
+                      <a:solidFill>
+                        <a:srgbClr val="666666">
+                          <a:alpha val="100000"/>
+                        </a:srgbClr>
+                      </a:solidFill>
+                      <a:prstDash val="solid"/>
+                    </a:lnB>
+                    <a:solidFill>
+                      <a:srgbClr val="FFFFFF">
+                        <a:alpha val="0"/>
+                      </a:srgbClr>
+                    </a:solidFill>
+                  </a:tcPr>
+                </a:tc>
+              </a:tr>
+              <a:tr h="378410">
+                <a:tc>
+                  <a:txBody>
+                    <a:bodyPr/>
+                    <a:lstStyle/>
+                    <a:p>
+                      <a:pPr algn="l" marL="63500" marR="63500">
+                        <a:lnSpc>
+                          <a:spcPct val="75000"/>
+                        </a:lnSpc>
+                        <a:spcBef>
+                          <a:spcPts val="500"/>
+                        </a:spcBef>
+                        <a:spcAft>
+                          <a:spcPts val="500"/>
+                        </a:spcAft>
+                        <a:buNone/>
+                      </a:pPr>
+                      <a:r>
+                        <a:rPr cap="none" sz="1000" i="0" b="0" u="none">
+                          <a:solidFill>
+                            <a:srgbClr val="000000">
+                              <a:alpha val="100000"/>
+                            </a:srgbClr>
+                          </a:solidFill>
+                          <a:latin typeface="Source Sans Pro"/>
+                          <a:cs typeface="Source Sans Pro"/>
+                          <a:ea typeface="Source Sans Pro"/>
+                          <a:sym typeface="Source Sans Pro"/>
+                        </a:rPr>
                         <a:t>Average</a:t>
                       </a:r>
                     </a:p>
@@ -9985,7 +9985,7 @@
                   </a:tcPr>
                 </a:tc>
               </a:tr>
-              <a:tr h="354101">
+              <a:tr h="353667">
                 <a:tc>
                   <a:txBody>
                     <a:bodyPr/>
@@ -10871,7 +10871,7 @@
                   </a:tcPr>
                 </a:tc>
               </a:tr>
-              <a:tr h="354721">
+              <a:tr h="353667">
                 <a:tc>
                   <a:txBody>
                     <a:bodyPr/>
@@ -11300,7 +11300,7 @@
                   </a:tcPr>
                 </a:tc>
               </a:tr>
-              <a:tr h="380270">
+              <a:tr h="378410">
                 <a:tc>
                   <a:txBody>
                     <a:bodyPr/>
@@ -11729,7 +11729,7 @@
                   </a:tcPr>
                 </a:tc>
               </a:tr>
-              <a:tr h="379960">
+              <a:tr h="378410">
                 <a:tc>
                   <a:txBody>
                     <a:bodyPr/>
@@ -12158,7 +12158,7 @@
                   </a:tcPr>
                 </a:tc>
               </a:tr>
-              <a:tr h="354101">
+              <a:tr h="353667">
                 <a:tc>
                   <a:txBody>
                     <a:bodyPr/>
@@ -13044,7 +13044,7 @@
                   </a:tcPr>
                 </a:tc>
               </a:tr>
-              <a:tr h="354535">
+              <a:tr h="353667">
                 <a:tc>
                   <a:txBody>
                     <a:bodyPr/>
@@ -13074,7 +13074,7 @@
                           <a:ea typeface="Source Sans Pro"/>
                           <a:sym typeface="Source Sans Pro"/>
                         </a:rPr>
-                        <a:t>New Zealand</a:t>
+                        <a:t>Australia</a:t>
                       </a:r>
                     </a:p>
                   </a:txBody>
@@ -13135,7 +13135,7 @@
                           <a:ea typeface="Source Sans Pro"/>
                           <a:sym typeface="Source Sans Pro"/>
                         </a:rPr>
-                        <a:t>70.26</a:t>
+                        <a:t>70.33</a:t>
                       </a:r>
                     </a:p>
                   </a:txBody>
@@ -13196,7 +13196,7 @@
                           <a:ea typeface="Source Sans Pro"/>
                           <a:sym typeface="Source Sans Pro"/>
                         </a:rPr>
-                        <a:t>71.52</a:t>
+                        <a:t>71.10</a:t>
                       </a:r>
                     </a:p>
                   </a:txBody>
@@ -13257,7 +13257,7 @@
                           <a:ea typeface="Source Sans Pro"/>
                           <a:sym typeface="Source Sans Pro"/>
                         </a:rPr>
-                        <a:t>72.22</a:t>
+                        <a:t>73.49</a:t>
                       </a:r>
                     </a:p>
                   </a:txBody>
@@ -13318,7 +13318,7 @@
                           <a:ea typeface="Source Sans Pro"/>
                           <a:sym typeface="Source Sans Pro"/>
                         </a:rPr>
-                        <a:t>74.32</a:t>
+                        <a:t>76.32</a:t>
                       </a:r>
                     </a:p>
                   </a:txBody>
@@ -13379,7 +13379,7 @@
                           <a:ea typeface="Source Sans Pro"/>
                           <a:sym typeface="Source Sans Pro"/>
                         </a:rPr>
-                        <a:t>77.55</a:t>
+                        <a:t>78.83</a:t>
                       </a:r>
                     </a:p>
                   </a:txBody>
@@ -13440,7 +13440,7 @@
                           <a:ea typeface="Source Sans Pro"/>
                           <a:sym typeface="Source Sans Pro"/>
                         </a:rPr>
-                        <a:t>80.20</a:t>
+                        <a:t>81.23</a:t>
                       </a:r>
                     </a:p>
                   </a:txBody>
@@ -13473,7 +13473,7 @@
                   </a:tcPr>
                 </a:tc>
               </a:tr>
-              <a:tr h="354411">
+              <a:tr h="353667">
                 <a:tc>
                   <a:txBody>
                     <a:bodyPr/>
@@ -13503,7 +13503,7 @@
                           <a:ea typeface="Source Sans Pro"/>
                           <a:sym typeface="Source Sans Pro"/>
                         </a:rPr>
-                        <a:t>Australia</a:t>
+                        <a:t>New Zealand</a:t>
                       </a:r>
                     </a:p>
                   </a:txBody>
@@ -13564,7 +13564,7 @@
                           <a:ea typeface="Source Sans Pro"/>
                           <a:sym typeface="Source Sans Pro"/>
                         </a:rPr>
-                        <a:t>70.33</a:t>
+                        <a:t>70.26</a:t>
                       </a:r>
                     </a:p>
                   </a:txBody>
@@ -13625,7 +13625,7 @@
                           <a:ea typeface="Source Sans Pro"/>
                           <a:sym typeface="Source Sans Pro"/>
                         </a:rPr>
-                        <a:t>71.10</a:t>
+                        <a:t>71.52</a:t>
                       </a:r>
                     </a:p>
                   </a:txBody>
@@ -13686,7 +13686,7 @@
                           <a:ea typeface="Source Sans Pro"/>
                           <a:sym typeface="Source Sans Pro"/>
                         </a:rPr>
-                        <a:t>73.49</a:t>
+                        <a:t>72.22</a:t>
                       </a:r>
                     </a:p>
                   </a:txBody>
@@ -13747,7 +13747,7 @@
                           <a:ea typeface="Source Sans Pro"/>
                           <a:sym typeface="Source Sans Pro"/>
                         </a:rPr>
-                        <a:t>76.32</a:t>
+                        <a:t>74.32</a:t>
                       </a:r>
                     </a:p>
                   </a:txBody>
@@ -13808,7 +13808,7 @@
                           <a:ea typeface="Source Sans Pro"/>
                           <a:sym typeface="Source Sans Pro"/>
                         </a:rPr>
-                        <a:t>78.83</a:t>
+                        <a:t>77.55</a:t>
                       </a:r>
                     </a:p>
                   </a:txBody>
@@ -13869,7 +13869,7 @@
                           <a:ea typeface="Source Sans Pro"/>
                           <a:sym typeface="Source Sans Pro"/>
                         </a:rPr>
-                        <a:t>81.23</a:t>
+                        <a:t>80.20</a:t>
                       </a:r>
                     </a:p>
                   </a:txBody>
@@ -13902,7 +13902,7 @@
                   </a:tcPr>
                 </a:tc>
               </a:tr>
-              <a:tr h="379960">
+              <a:tr h="378410">
                 <a:tc>
                   <a:txBody>
                     <a:bodyPr/>
@@ -14331,7 +14331,7 @@
                   </a:tcPr>
                 </a:tc>
               </a:tr>
-              <a:tr h="354101">
+              <a:tr h="353667">
                 <a:tc>
                   <a:txBody>
                     <a:bodyPr/>

</xml_diff>

<commit_message>
Update final table outputs
</commit_message>
<xml_diff>
--- a/final_table_exercises.pptx
+++ b/final_table_exercises.pptx
@@ -2239,7 +2239,7 @@
                 <a:gridCol w="578583"/>
                 <a:gridCol w="578583"/>
               </a:tblGrid>
-              <a:tr h="472295">
+              <a:tr h="457561">
                 <a:tc gridSpan="7">
                   <a:txBody>
                     <a:bodyPr/>
@@ -3069,7 +3069,7 @@
                   </a:tcPr>
                 </a:tc>
               </a:tr>
-              <a:tr h="353667">
+              <a:tr h="343869">
                 <a:tc>
                   <a:txBody>
                     <a:bodyPr/>
@@ -3494,7 +3494,7 @@
                   </a:tcPr>
                 </a:tc>
               </a:tr>
-              <a:tr h="353605">
+              <a:tr h="352427">
                 <a:tc>
                   <a:txBody>
                     <a:bodyPr/>
@@ -4352,7 +4352,7 @@
                   </a:tcPr>
                 </a:tc>
               </a:tr>
-              <a:tr h="378410">
+              <a:tr h="379960">
                 <a:tc>
                   <a:txBody>
                     <a:bodyPr/>
@@ -4781,7 +4781,7 @@
                   </a:tcPr>
                 </a:tc>
               </a:tr>
-              <a:tr h="354783">
+              <a:tr h="357016">
                 <a:tc>
                   <a:txBody>
                     <a:bodyPr/>
@@ -5210,7 +5210,7 @@
                   </a:tcPr>
                 </a:tc>
               </a:tr>
-              <a:tr h="378410">
+              <a:tr h="379960">
                 <a:tc>
                   <a:txBody>
                     <a:bodyPr/>
@@ -5639,7 +5639,7 @@
                   </a:tcPr>
                 </a:tc>
               </a:tr>
-              <a:tr h="353667">
+              <a:tr h="354101">
                 <a:tc>
                   <a:txBody>
                     <a:bodyPr/>
@@ -6525,7 +6525,7 @@
                   </a:tcPr>
                 </a:tc>
               </a:tr>
-              <a:tr h="353605">
+              <a:tr h="354287">
                 <a:tc>
                   <a:txBody>
                     <a:bodyPr/>
@@ -6954,7 +6954,7 @@
                   </a:tcPr>
                 </a:tc>
               </a:tr>
-              <a:tr h="378410">
+              <a:tr h="379960">
                 <a:tc>
                   <a:txBody>
                     <a:bodyPr/>
@@ -7383,7 +7383,7 @@
                   </a:tcPr>
                 </a:tc>
               </a:tr>
-              <a:tr h="378410">
+              <a:tr h="379960">
                 <a:tc>
                   <a:txBody>
                     <a:bodyPr/>
@@ -7812,7 +7812,7 @@
                   </a:tcPr>
                 </a:tc>
               </a:tr>
-              <a:tr h="353605">
+              <a:tr h="354101">
                 <a:tc>
                   <a:txBody>
                     <a:bodyPr/>
@@ -8698,7 +8698,7 @@
                   </a:tcPr>
                 </a:tc>
               </a:tr>
-              <a:tr h="379960">
+              <a:tr h="382440">
                 <a:tc>
                   <a:txBody>
                     <a:bodyPr/>
@@ -9117,6 +9117,435 @@
                     </a:lnT>
                     <a:lnB algn="ctr" cmpd="sng" cap="flat" w="0">
                       <a:noFill/>
+                      <a:prstDash val="solid"/>
+                    </a:lnB>
+                    <a:solidFill>
+                      <a:srgbClr val="FFFFFF">
+                        <a:alpha val="0"/>
+                      </a:srgbClr>
+                    </a:solidFill>
+                  </a:tcPr>
+                </a:tc>
+              </a:tr>
+              <a:tr h="381572">
+                <a:tc>
+                  <a:txBody>
+                    <a:bodyPr/>
+                    <a:lstStyle/>
+                    <a:p>
+                      <a:pPr algn="l" marL="63500" marR="63500">
+                        <a:lnSpc>
+                          <a:spcPct val="75000"/>
+                        </a:lnSpc>
+                        <a:spcBef>
+                          <a:spcPts val="500"/>
+                        </a:spcBef>
+                        <a:spcAft>
+                          <a:spcPts val="500"/>
+                        </a:spcAft>
+                        <a:buNone/>
+                      </a:pPr>
+                      <a:r>
+                        <a:rPr cap="none" sz="1000" i="0" b="0" u="none">
+                          <a:solidFill>
+                            <a:srgbClr val="000000">
+                              <a:alpha val="100000"/>
+                            </a:srgbClr>
+                          </a:solidFill>
+                          <a:latin typeface="Source Sans Pro"/>
+                          <a:cs typeface="Source Sans Pro"/>
+                          <a:ea typeface="Source Sans Pro"/>
+                          <a:sym typeface="Source Sans Pro"/>
+                        </a:rPr>
+                        <a:t>Syria</a:t>
+                      </a:r>
+                    </a:p>
+                  </a:txBody>
+                  <a:tcPr anchor="ctr" marB="63500" marT="63500" marR="0" marL="0">
+                    <a:lnL algn="ctr" cmpd="sng" cap="flat" w="0">
+                      <a:noFill/>
+                      <a:prstDash val="solid"/>
+                    </a:lnL>
+                    <a:lnR algn="ctr" cmpd="sng" cap="flat" w="0">
+                      <a:noFill/>
+                      <a:prstDash val="solid"/>
+                    </a:lnR>
+                    <a:lnT algn="ctr" cmpd="sng" cap="flat" w="0">
+                      <a:noFill/>
+                      <a:prstDash val="solid"/>
+                    </a:lnT>
+                    <a:lnB algn="ctr" cmpd="sng" cap="flat" w="12700">
+                      <a:solidFill>
+                        <a:srgbClr val="666666">
+                          <a:alpha val="100000"/>
+                        </a:srgbClr>
+                      </a:solidFill>
+                      <a:prstDash val="solid"/>
+                    </a:lnB>
+                    <a:solidFill>
+                      <a:srgbClr val="FFFFFF">
+                        <a:alpha val="0"/>
+                      </a:srgbClr>
+                    </a:solidFill>
+                  </a:tcPr>
+                </a:tc>
+                <a:tc>
+                  <a:txBody>
+                    <a:bodyPr/>
+                    <a:lstStyle/>
+                    <a:p>
+                      <a:pPr algn="r" marL="63500" marR="63500">
+                        <a:lnSpc>
+                          <a:spcPct val="75000"/>
+                        </a:lnSpc>
+                        <a:spcBef>
+                          <a:spcPts val="500"/>
+                        </a:spcBef>
+                        <a:spcAft>
+                          <a:spcPts val="500"/>
+                        </a:spcAft>
+                        <a:buNone/>
+                      </a:pPr>
+                      <a:r>
+                        <a:rPr cap="none" sz="1000" i="0" b="0" u="none">
+                          <a:solidFill>
+                            <a:srgbClr val="000000">
+                              <a:alpha val="100000"/>
+                            </a:srgbClr>
+                          </a:solidFill>
+                          <a:latin typeface="Source Sans Pro"/>
+                          <a:cs typeface="Source Sans Pro"/>
+                          <a:ea typeface="Source Sans Pro"/>
+                          <a:sym typeface="Source Sans Pro"/>
+                        </a:rPr>
+                        <a:t>48.28</a:t>
+                      </a:r>
+                    </a:p>
+                  </a:txBody>
+                  <a:tcPr anchor="ctr" marB="63500" marT="63500" marR="0" marL="0">
+                    <a:lnL algn="ctr" cmpd="sng" cap="flat" w="0">
+                      <a:noFill/>
+                      <a:prstDash val="solid"/>
+                    </a:lnL>
+                    <a:lnR algn="ctr" cmpd="sng" cap="flat" w="0">
+                      <a:noFill/>
+                      <a:prstDash val="solid"/>
+                    </a:lnR>
+                    <a:lnT algn="ctr" cmpd="sng" cap="flat" w="0">
+                      <a:noFill/>
+                      <a:prstDash val="solid"/>
+                    </a:lnT>
+                    <a:lnB algn="ctr" cmpd="sng" cap="flat" w="12700">
+                      <a:solidFill>
+                        <a:srgbClr val="666666">
+                          <a:alpha val="100000"/>
+                        </a:srgbClr>
+                      </a:solidFill>
+                      <a:prstDash val="solid"/>
+                    </a:lnB>
+                    <a:solidFill>
+                      <a:srgbClr val="FFFFFF">
+                        <a:alpha val="0"/>
+                      </a:srgbClr>
+                    </a:solidFill>
+                  </a:tcPr>
+                </a:tc>
+                <a:tc>
+                  <a:txBody>
+                    <a:bodyPr/>
+                    <a:lstStyle/>
+                    <a:p>
+                      <a:pPr algn="r" marL="63500" marR="63500">
+                        <a:lnSpc>
+                          <a:spcPct val="75000"/>
+                        </a:lnSpc>
+                        <a:spcBef>
+                          <a:spcPts val="500"/>
+                        </a:spcBef>
+                        <a:spcAft>
+                          <a:spcPts val="500"/>
+                        </a:spcAft>
+                        <a:buNone/>
+                      </a:pPr>
+                      <a:r>
+                        <a:rPr cap="none" sz="1000" i="0" b="0" u="none">
+                          <a:solidFill>
+                            <a:srgbClr val="000000">
+                              <a:alpha val="100000"/>
+                            </a:srgbClr>
+                          </a:solidFill>
+                          <a:latin typeface="Source Sans Pro"/>
+                          <a:cs typeface="Source Sans Pro"/>
+                          <a:ea typeface="Source Sans Pro"/>
+                          <a:sym typeface="Source Sans Pro"/>
+                        </a:rPr>
+                        <a:t>53.66</a:t>
+                      </a:r>
+                    </a:p>
+                  </a:txBody>
+                  <a:tcPr anchor="ctr" marB="63500" marT="63500" marR="0" marL="0">
+                    <a:lnL algn="ctr" cmpd="sng" cap="flat" w="0">
+                      <a:noFill/>
+                      <a:prstDash val="solid"/>
+                    </a:lnL>
+                    <a:lnR algn="ctr" cmpd="sng" cap="flat" w="0">
+                      <a:noFill/>
+                      <a:prstDash val="solid"/>
+                    </a:lnR>
+                    <a:lnT algn="ctr" cmpd="sng" cap="flat" w="0">
+                      <a:noFill/>
+                      <a:prstDash val="solid"/>
+                    </a:lnT>
+                    <a:lnB algn="ctr" cmpd="sng" cap="flat" w="12700">
+                      <a:solidFill>
+                        <a:srgbClr val="666666">
+                          <a:alpha val="100000"/>
+                        </a:srgbClr>
+                      </a:solidFill>
+                      <a:prstDash val="solid"/>
+                    </a:lnB>
+                    <a:solidFill>
+                      <a:srgbClr val="FFFFFF">
+                        <a:alpha val="0"/>
+                      </a:srgbClr>
+                    </a:solidFill>
+                  </a:tcPr>
+                </a:tc>
+                <a:tc>
+                  <a:txBody>
+                    <a:bodyPr/>
+                    <a:lstStyle/>
+                    <a:p>
+                      <a:pPr algn="r" marL="63500" marR="63500">
+                        <a:lnSpc>
+                          <a:spcPct val="75000"/>
+                        </a:lnSpc>
+                        <a:spcBef>
+                          <a:spcPts val="500"/>
+                        </a:spcBef>
+                        <a:spcAft>
+                          <a:spcPts val="500"/>
+                        </a:spcAft>
+                        <a:buNone/>
+                      </a:pPr>
+                      <a:r>
+                        <a:rPr cap="none" sz="1000" i="0" b="0" u="none">
+                          <a:solidFill>
+                            <a:srgbClr val="000000">
+                              <a:alpha val="100000"/>
+                            </a:srgbClr>
+                          </a:solidFill>
+                          <a:latin typeface="Source Sans Pro"/>
+                          <a:cs typeface="Source Sans Pro"/>
+                          <a:ea typeface="Source Sans Pro"/>
+                          <a:sym typeface="Source Sans Pro"/>
+                        </a:rPr>
+                        <a:t>61.20</a:t>
+                      </a:r>
+                    </a:p>
+                  </a:txBody>
+                  <a:tcPr anchor="ctr" marB="63500" marT="63500" marR="0" marL="0">
+                    <a:lnL algn="ctr" cmpd="sng" cap="flat" w="0">
+                      <a:noFill/>
+                      <a:prstDash val="solid"/>
+                    </a:lnL>
+                    <a:lnR algn="ctr" cmpd="sng" cap="flat" w="0">
+                      <a:noFill/>
+                      <a:prstDash val="solid"/>
+                    </a:lnR>
+                    <a:lnT algn="ctr" cmpd="sng" cap="flat" w="0">
+                      <a:noFill/>
+                      <a:prstDash val="solid"/>
+                    </a:lnT>
+                    <a:lnB algn="ctr" cmpd="sng" cap="flat" w="12700">
+                      <a:solidFill>
+                        <a:srgbClr val="666666">
+                          <a:alpha val="100000"/>
+                        </a:srgbClr>
+                      </a:solidFill>
+                      <a:prstDash val="solid"/>
+                    </a:lnB>
+                    <a:solidFill>
+                      <a:srgbClr val="FFFFFF">
+                        <a:alpha val="0"/>
+                      </a:srgbClr>
+                    </a:solidFill>
+                  </a:tcPr>
+                </a:tc>
+                <a:tc>
+                  <a:txBody>
+                    <a:bodyPr/>
+                    <a:lstStyle/>
+                    <a:p>
+                      <a:pPr algn="r" marL="63500" marR="63500">
+                        <a:lnSpc>
+                          <a:spcPct val="75000"/>
+                        </a:lnSpc>
+                        <a:spcBef>
+                          <a:spcPts val="500"/>
+                        </a:spcBef>
+                        <a:spcAft>
+                          <a:spcPts val="500"/>
+                        </a:spcAft>
+                        <a:buNone/>
+                      </a:pPr>
+                      <a:r>
+                        <a:rPr cap="none" sz="1000" i="0" b="0" u="none">
+                          <a:solidFill>
+                            <a:srgbClr val="000000">
+                              <a:alpha val="100000"/>
+                            </a:srgbClr>
+                          </a:solidFill>
+                          <a:latin typeface="Source Sans Pro"/>
+                          <a:cs typeface="Source Sans Pro"/>
+                          <a:ea typeface="Source Sans Pro"/>
+                          <a:sym typeface="Source Sans Pro"/>
+                        </a:rPr>
+                        <a:t>66.97</a:t>
+                      </a:r>
+                    </a:p>
+                  </a:txBody>
+                  <a:tcPr anchor="ctr" marB="63500" marT="63500" marR="0" marL="0">
+                    <a:lnL algn="ctr" cmpd="sng" cap="flat" w="0">
+                      <a:noFill/>
+                      <a:prstDash val="solid"/>
+                    </a:lnL>
+                    <a:lnR algn="ctr" cmpd="sng" cap="flat" w="0">
+                      <a:noFill/>
+                      <a:prstDash val="solid"/>
+                    </a:lnR>
+                    <a:lnT algn="ctr" cmpd="sng" cap="flat" w="0">
+                      <a:noFill/>
+                      <a:prstDash val="solid"/>
+                    </a:lnT>
+                    <a:lnB algn="ctr" cmpd="sng" cap="flat" w="12700">
+                      <a:solidFill>
+                        <a:srgbClr val="666666">
+                          <a:alpha val="100000"/>
+                        </a:srgbClr>
+                      </a:solidFill>
+                      <a:prstDash val="solid"/>
+                    </a:lnB>
+                    <a:solidFill>
+                      <a:srgbClr val="FFFFFF">
+                        <a:alpha val="0"/>
+                      </a:srgbClr>
+                    </a:solidFill>
+                  </a:tcPr>
+                </a:tc>
+                <a:tc>
+                  <a:txBody>
+                    <a:bodyPr/>
+                    <a:lstStyle/>
+                    <a:p>
+                      <a:pPr algn="r" marL="63500" marR="63500">
+                        <a:lnSpc>
+                          <a:spcPct val="75000"/>
+                        </a:lnSpc>
+                        <a:spcBef>
+                          <a:spcPts val="500"/>
+                        </a:spcBef>
+                        <a:spcAft>
+                          <a:spcPts val="500"/>
+                        </a:spcAft>
+                        <a:buNone/>
+                      </a:pPr>
+                      <a:r>
+                        <a:rPr cap="none" sz="1000" i="0" b="0" u="none">
+                          <a:solidFill>
+                            <a:srgbClr val="000000">
+                              <a:alpha val="100000"/>
+                            </a:srgbClr>
+                          </a:solidFill>
+                          <a:latin typeface="Source Sans Pro"/>
+                          <a:cs typeface="Source Sans Pro"/>
+                          <a:ea typeface="Source Sans Pro"/>
+                          <a:sym typeface="Source Sans Pro"/>
+                        </a:rPr>
+                        <a:t>71.53</a:t>
+                      </a:r>
+                    </a:p>
+                  </a:txBody>
+                  <a:tcPr anchor="ctr" marB="63500" marT="63500" marR="0" marL="0">
+                    <a:lnL algn="ctr" cmpd="sng" cap="flat" w="0">
+                      <a:noFill/>
+                      <a:prstDash val="solid"/>
+                    </a:lnL>
+                    <a:lnR algn="ctr" cmpd="sng" cap="flat" w="0">
+                      <a:noFill/>
+                      <a:prstDash val="solid"/>
+                    </a:lnR>
+                    <a:lnT algn="ctr" cmpd="sng" cap="flat" w="0">
+                      <a:noFill/>
+                      <a:prstDash val="solid"/>
+                    </a:lnT>
+                    <a:lnB algn="ctr" cmpd="sng" cap="flat" w="12700">
+                      <a:solidFill>
+                        <a:srgbClr val="666666">
+                          <a:alpha val="100000"/>
+                        </a:srgbClr>
+                      </a:solidFill>
+                      <a:prstDash val="solid"/>
+                    </a:lnB>
+                    <a:solidFill>
+                      <a:srgbClr val="FFFFFF">
+                        <a:alpha val="0"/>
+                      </a:srgbClr>
+                    </a:solidFill>
+                  </a:tcPr>
+                </a:tc>
+                <a:tc>
+                  <a:txBody>
+                    <a:bodyPr/>
+                    <a:lstStyle/>
+                    <a:p>
+                      <a:pPr algn="r" marL="63500" marR="63500">
+                        <a:lnSpc>
+                          <a:spcPct val="75000"/>
+                        </a:lnSpc>
+                        <a:spcBef>
+                          <a:spcPts val="500"/>
+                        </a:spcBef>
+                        <a:spcAft>
+                          <a:spcPts val="500"/>
+                        </a:spcAft>
+                        <a:buNone/>
+                      </a:pPr>
+                      <a:r>
+                        <a:rPr cap="none" sz="1000" i="0" b="0" u="none">
+                          <a:solidFill>
+                            <a:srgbClr val="000000">
+                              <a:alpha val="100000"/>
+                            </a:srgbClr>
+                          </a:solidFill>
+                          <a:latin typeface="Source Sans Pro"/>
+                          <a:cs typeface="Source Sans Pro"/>
+                          <a:ea typeface="Source Sans Pro"/>
+                          <a:sym typeface="Source Sans Pro"/>
+                        </a:rPr>
+                        <a:t>74.14</a:t>
+                      </a:r>
+                    </a:p>
+                  </a:txBody>
+                  <a:tcPr anchor="ctr" marB="63500" marT="63500" marR="0" marL="0">
+                    <a:lnL algn="ctr" cmpd="sng" cap="flat" w="0">
+                      <a:noFill/>
+                      <a:prstDash val="solid"/>
+                    </a:lnL>
+                    <a:lnR algn="ctr" cmpd="sng" cap="flat" w="0">
+                      <a:noFill/>
+                      <a:prstDash val="solid"/>
+                    </a:lnR>
+                    <a:lnT algn="ctr" cmpd="sng" cap="flat" w="0">
+                      <a:noFill/>
+                      <a:prstDash val="solid"/>
+                    </a:lnT>
+                    <a:lnB algn="ctr" cmpd="sng" cap="flat" w="12700">
+                      <a:solidFill>
+                        <a:srgbClr val="666666">
+                          <a:alpha val="100000"/>
+                        </a:srgbClr>
+                      </a:solidFill>
                       <a:prstDash val="solid"/>
                     </a:lnB>
                     <a:solidFill>
@@ -9157,435 +9586,6 @@
                           <a:ea typeface="Source Sans Pro"/>
                           <a:sym typeface="Source Sans Pro"/>
                         </a:rPr>
-                        <a:t>Syria</a:t>
-                      </a:r>
-                    </a:p>
-                  </a:txBody>
-                  <a:tcPr anchor="ctr" marB="63500" marT="63500" marR="0" marL="0">
-                    <a:lnL algn="ctr" cmpd="sng" cap="flat" w="0">
-                      <a:noFill/>
-                      <a:prstDash val="solid"/>
-                    </a:lnL>
-                    <a:lnR algn="ctr" cmpd="sng" cap="flat" w="0">
-                      <a:noFill/>
-                      <a:prstDash val="solid"/>
-                    </a:lnR>
-                    <a:lnT algn="ctr" cmpd="sng" cap="flat" w="0">
-                      <a:noFill/>
-                      <a:prstDash val="solid"/>
-                    </a:lnT>
-                    <a:lnB algn="ctr" cmpd="sng" cap="flat" w="12700">
-                      <a:solidFill>
-                        <a:srgbClr val="666666">
-                          <a:alpha val="100000"/>
-                        </a:srgbClr>
-                      </a:solidFill>
-                      <a:prstDash val="solid"/>
-                    </a:lnB>
-                    <a:solidFill>
-                      <a:srgbClr val="FFFFFF">
-                        <a:alpha val="0"/>
-                      </a:srgbClr>
-                    </a:solidFill>
-                  </a:tcPr>
-                </a:tc>
-                <a:tc>
-                  <a:txBody>
-                    <a:bodyPr/>
-                    <a:lstStyle/>
-                    <a:p>
-                      <a:pPr algn="r" marL="63500" marR="63500">
-                        <a:lnSpc>
-                          <a:spcPct val="75000"/>
-                        </a:lnSpc>
-                        <a:spcBef>
-                          <a:spcPts val="500"/>
-                        </a:spcBef>
-                        <a:spcAft>
-                          <a:spcPts val="500"/>
-                        </a:spcAft>
-                        <a:buNone/>
-                      </a:pPr>
-                      <a:r>
-                        <a:rPr cap="none" sz="1000" i="0" b="0" u="none">
-                          <a:solidFill>
-                            <a:srgbClr val="000000">
-                              <a:alpha val="100000"/>
-                            </a:srgbClr>
-                          </a:solidFill>
-                          <a:latin typeface="Source Sans Pro"/>
-                          <a:cs typeface="Source Sans Pro"/>
-                          <a:ea typeface="Source Sans Pro"/>
-                          <a:sym typeface="Source Sans Pro"/>
-                        </a:rPr>
-                        <a:t>48.28</a:t>
-                      </a:r>
-                    </a:p>
-                  </a:txBody>
-                  <a:tcPr anchor="ctr" marB="63500" marT="63500" marR="0" marL="0">
-                    <a:lnL algn="ctr" cmpd="sng" cap="flat" w="0">
-                      <a:noFill/>
-                      <a:prstDash val="solid"/>
-                    </a:lnL>
-                    <a:lnR algn="ctr" cmpd="sng" cap="flat" w="0">
-                      <a:noFill/>
-                      <a:prstDash val="solid"/>
-                    </a:lnR>
-                    <a:lnT algn="ctr" cmpd="sng" cap="flat" w="0">
-                      <a:noFill/>
-                      <a:prstDash val="solid"/>
-                    </a:lnT>
-                    <a:lnB algn="ctr" cmpd="sng" cap="flat" w="12700">
-                      <a:solidFill>
-                        <a:srgbClr val="666666">
-                          <a:alpha val="100000"/>
-                        </a:srgbClr>
-                      </a:solidFill>
-                      <a:prstDash val="solid"/>
-                    </a:lnB>
-                    <a:solidFill>
-                      <a:srgbClr val="FFFFFF">
-                        <a:alpha val="0"/>
-                      </a:srgbClr>
-                    </a:solidFill>
-                  </a:tcPr>
-                </a:tc>
-                <a:tc>
-                  <a:txBody>
-                    <a:bodyPr/>
-                    <a:lstStyle/>
-                    <a:p>
-                      <a:pPr algn="r" marL="63500" marR="63500">
-                        <a:lnSpc>
-                          <a:spcPct val="75000"/>
-                        </a:lnSpc>
-                        <a:spcBef>
-                          <a:spcPts val="500"/>
-                        </a:spcBef>
-                        <a:spcAft>
-                          <a:spcPts val="500"/>
-                        </a:spcAft>
-                        <a:buNone/>
-                      </a:pPr>
-                      <a:r>
-                        <a:rPr cap="none" sz="1000" i="0" b="0" u="none">
-                          <a:solidFill>
-                            <a:srgbClr val="000000">
-                              <a:alpha val="100000"/>
-                            </a:srgbClr>
-                          </a:solidFill>
-                          <a:latin typeface="Source Sans Pro"/>
-                          <a:cs typeface="Source Sans Pro"/>
-                          <a:ea typeface="Source Sans Pro"/>
-                          <a:sym typeface="Source Sans Pro"/>
-                        </a:rPr>
-                        <a:t>53.66</a:t>
-                      </a:r>
-                    </a:p>
-                  </a:txBody>
-                  <a:tcPr anchor="ctr" marB="63500" marT="63500" marR="0" marL="0">
-                    <a:lnL algn="ctr" cmpd="sng" cap="flat" w="0">
-                      <a:noFill/>
-                      <a:prstDash val="solid"/>
-                    </a:lnL>
-                    <a:lnR algn="ctr" cmpd="sng" cap="flat" w="0">
-                      <a:noFill/>
-                      <a:prstDash val="solid"/>
-                    </a:lnR>
-                    <a:lnT algn="ctr" cmpd="sng" cap="flat" w="0">
-                      <a:noFill/>
-                      <a:prstDash val="solid"/>
-                    </a:lnT>
-                    <a:lnB algn="ctr" cmpd="sng" cap="flat" w="12700">
-                      <a:solidFill>
-                        <a:srgbClr val="666666">
-                          <a:alpha val="100000"/>
-                        </a:srgbClr>
-                      </a:solidFill>
-                      <a:prstDash val="solid"/>
-                    </a:lnB>
-                    <a:solidFill>
-                      <a:srgbClr val="FFFFFF">
-                        <a:alpha val="0"/>
-                      </a:srgbClr>
-                    </a:solidFill>
-                  </a:tcPr>
-                </a:tc>
-                <a:tc>
-                  <a:txBody>
-                    <a:bodyPr/>
-                    <a:lstStyle/>
-                    <a:p>
-                      <a:pPr algn="r" marL="63500" marR="63500">
-                        <a:lnSpc>
-                          <a:spcPct val="75000"/>
-                        </a:lnSpc>
-                        <a:spcBef>
-                          <a:spcPts val="500"/>
-                        </a:spcBef>
-                        <a:spcAft>
-                          <a:spcPts val="500"/>
-                        </a:spcAft>
-                        <a:buNone/>
-                      </a:pPr>
-                      <a:r>
-                        <a:rPr cap="none" sz="1000" i="0" b="0" u="none">
-                          <a:solidFill>
-                            <a:srgbClr val="000000">
-                              <a:alpha val="100000"/>
-                            </a:srgbClr>
-                          </a:solidFill>
-                          <a:latin typeface="Source Sans Pro"/>
-                          <a:cs typeface="Source Sans Pro"/>
-                          <a:ea typeface="Source Sans Pro"/>
-                          <a:sym typeface="Source Sans Pro"/>
-                        </a:rPr>
-                        <a:t>61.20</a:t>
-                      </a:r>
-                    </a:p>
-                  </a:txBody>
-                  <a:tcPr anchor="ctr" marB="63500" marT="63500" marR="0" marL="0">
-                    <a:lnL algn="ctr" cmpd="sng" cap="flat" w="0">
-                      <a:noFill/>
-                      <a:prstDash val="solid"/>
-                    </a:lnL>
-                    <a:lnR algn="ctr" cmpd="sng" cap="flat" w="0">
-                      <a:noFill/>
-                      <a:prstDash val="solid"/>
-                    </a:lnR>
-                    <a:lnT algn="ctr" cmpd="sng" cap="flat" w="0">
-                      <a:noFill/>
-                      <a:prstDash val="solid"/>
-                    </a:lnT>
-                    <a:lnB algn="ctr" cmpd="sng" cap="flat" w="12700">
-                      <a:solidFill>
-                        <a:srgbClr val="666666">
-                          <a:alpha val="100000"/>
-                        </a:srgbClr>
-                      </a:solidFill>
-                      <a:prstDash val="solid"/>
-                    </a:lnB>
-                    <a:solidFill>
-                      <a:srgbClr val="FFFFFF">
-                        <a:alpha val="0"/>
-                      </a:srgbClr>
-                    </a:solidFill>
-                  </a:tcPr>
-                </a:tc>
-                <a:tc>
-                  <a:txBody>
-                    <a:bodyPr/>
-                    <a:lstStyle/>
-                    <a:p>
-                      <a:pPr algn="r" marL="63500" marR="63500">
-                        <a:lnSpc>
-                          <a:spcPct val="75000"/>
-                        </a:lnSpc>
-                        <a:spcBef>
-                          <a:spcPts val="500"/>
-                        </a:spcBef>
-                        <a:spcAft>
-                          <a:spcPts val="500"/>
-                        </a:spcAft>
-                        <a:buNone/>
-                      </a:pPr>
-                      <a:r>
-                        <a:rPr cap="none" sz="1000" i="0" b="0" u="none">
-                          <a:solidFill>
-                            <a:srgbClr val="000000">
-                              <a:alpha val="100000"/>
-                            </a:srgbClr>
-                          </a:solidFill>
-                          <a:latin typeface="Source Sans Pro"/>
-                          <a:cs typeface="Source Sans Pro"/>
-                          <a:ea typeface="Source Sans Pro"/>
-                          <a:sym typeface="Source Sans Pro"/>
-                        </a:rPr>
-                        <a:t>66.97</a:t>
-                      </a:r>
-                    </a:p>
-                  </a:txBody>
-                  <a:tcPr anchor="ctr" marB="63500" marT="63500" marR="0" marL="0">
-                    <a:lnL algn="ctr" cmpd="sng" cap="flat" w="0">
-                      <a:noFill/>
-                      <a:prstDash val="solid"/>
-                    </a:lnL>
-                    <a:lnR algn="ctr" cmpd="sng" cap="flat" w="0">
-                      <a:noFill/>
-                      <a:prstDash val="solid"/>
-                    </a:lnR>
-                    <a:lnT algn="ctr" cmpd="sng" cap="flat" w="0">
-                      <a:noFill/>
-                      <a:prstDash val="solid"/>
-                    </a:lnT>
-                    <a:lnB algn="ctr" cmpd="sng" cap="flat" w="12700">
-                      <a:solidFill>
-                        <a:srgbClr val="666666">
-                          <a:alpha val="100000"/>
-                        </a:srgbClr>
-                      </a:solidFill>
-                      <a:prstDash val="solid"/>
-                    </a:lnB>
-                    <a:solidFill>
-                      <a:srgbClr val="FFFFFF">
-                        <a:alpha val="0"/>
-                      </a:srgbClr>
-                    </a:solidFill>
-                  </a:tcPr>
-                </a:tc>
-                <a:tc>
-                  <a:txBody>
-                    <a:bodyPr/>
-                    <a:lstStyle/>
-                    <a:p>
-                      <a:pPr algn="r" marL="63500" marR="63500">
-                        <a:lnSpc>
-                          <a:spcPct val="75000"/>
-                        </a:lnSpc>
-                        <a:spcBef>
-                          <a:spcPts val="500"/>
-                        </a:spcBef>
-                        <a:spcAft>
-                          <a:spcPts val="500"/>
-                        </a:spcAft>
-                        <a:buNone/>
-                      </a:pPr>
-                      <a:r>
-                        <a:rPr cap="none" sz="1000" i="0" b="0" u="none">
-                          <a:solidFill>
-                            <a:srgbClr val="000000">
-                              <a:alpha val="100000"/>
-                            </a:srgbClr>
-                          </a:solidFill>
-                          <a:latin typeface="Source Sans Pro"/>
-                          <a:cs typeface="Source Sans Pro"/>
-                          <a:ea typeface="Source Sans Pro"/>
-                          <a:sym typeface="Source Sans Pro"/>
-                        </a:rPr>
-                        <a:t>71.53</a:t>
-                      </a:r>
-                    </a:p>
-                  </a:txBody>
-                  <a:tcPr anchor="ctr" marB="63500" marT="63500" marR="0" marL="0">
-                    <a:lnL algn="ctr" cmpd="sng" cap="flat" w="0">
-                      <a:noFill/>
-                      <a:prstDash val="solid"/>
-                    </a:lnL>
-                    <a:lnR algn="ctr" cmpd="sng" cap="flat" w="0">
-                      <a:noFill/>
-                      <a:prstDash val="solid"/>
-                    </a:lnR>
-                    <a:lnT algn="ctr" cmpd="sng" cap="flat" w="0">
-                      <a:noFill/>
-                      <a:prstDash val="solid"/>
-                    </a:lnT>
-                    <a:lnB algn="ctr" cmpd="sng" cap="flat" w="12700">
-                      <a:solidFill>
-                        <a:srgbClr val="666666">
-                          <a:alpha val="100000"/>
-                        </a:srgbClr>
-                      </a:solidFill>
-                      <a:prstDash val="solid"/>
-                    </a:lnB>
-                    <a:solidFill>
-                      <a:srgbClr val="FFFFFF">
-                        <a:alpha val="0"/>
-                      </a:srgbClr>
-                    </a:solidFill>
-                  </a:tcPr>
-                </a:tc>
-                <a:tc>
-                  <a:txBody>
-                    <a:bodyPr/>
-                    <a:lstStyle/>
-                    <a:p>
-                      <a:pPr algn="r" marL="63500" marR="63500">
-                        <a:lnSpc>
-                          <a:spcPct val="75000"/>
-                        </a:lnSpc>
-                        <a:spcBef>
-                          <a:spcPts val="500"/>
-                        </a:spcBef>
-                        <a:spcAft>
-                          <a:spcPts val="500"/>
-                        </a:spcAft>
-                        <a:buNone/>
-                      </a:pPr>
-                      <a:r>
-                        <a:rPr cap="none" sz="1000" i="0" b="0" u="none">
-                          <a:solidFill>
-                            <a:srgbClr val="000000">
-                              <a:alpha val="100000"/>
-                            </a:srgbClr>
-                          </a:solidFill>
-                          <a:latin typeface="Source Sans Pro"/>
-                          <a:cs typeface="Source Sans Pro"/>
-                          <a:ea typeface="Source Sans Pro"/>
-                          <a:sym typeface="Source Sans Pro"/>
-                        </a:rPr>
-                        <a:t>74.14</a:t>
-                      </a:r>
-                    </a:p>
-                  </a:txBody>
-                  <a:tcPr anchor="ctr" marB="63500" marT="63500" marR="0" marL="0">
-                    <a:lnL algn="ctr" cmpd="sng" cap="flat" w="0">
-                      <a:noFill/>
-                      <a:prstDash val="solid"/>
-                    </a:lnL>
-                    <a:lnR algn="ctr" cmpd="sng" cap="flat" w="0">
-                      <a:noFill/>
-                      <a:prstDash val="solid"/>
-                    </a:lnR>
-                    <a:lnT algn="ctr" cmpd="sng" cap="flat" w="0">
-                      <a:noFill/>
-                      <a:prstDash val="solid"/>
-                    </a:lnT>
-                    <a:lnB algn="ctr" cmpd="sng" cap="flat" w="12700">
-                      <a:solidFill>
-                        <a:srgbClr val="666666">
-                          <a:alpha val="100000"/>
-                        </a:srgbClr>
-                      </a:solidFill>
-                      <a:prstDash val="solid"/>
-                    </a:lnB>
-                    <a:solidFill>
-                      <a:srgbClr val="FFFFFF">
-                        <a:alpha val="0"/>
-                      </a:srgbClr>
-                    </a:solidFill>
-                  </a:tcPr>
-                </a:tc>
-              </a:tr>
-              <a:tr h="378410">
-                <a:tc>
-                  <a:txBody>
-                    <a:bodyPr/>
-                    <a:lstStyle/>
-                    <a:p>
-                      <a:pPr algn="l" marL="63500" marR="63500">
-                        <a:lnSpc>
-                          <a:spcPct val="75000"/>
-                        </a:lnSpc>
-                        <a:spcBef>
-                          <a:spcPts val="500"/>
-                        </a:spcBef>
-                        <a:spcAft>
-                          <a:spcPts val="500"/>
-                        </a:spcAft>
-                        <a:buNone/>
-                      </a:pPr>
-                      <a:r>
-                        <a:rPr cap="none" sz="1000" i="0" b="0" u="none">
-                          <a:solidFill>
-                            <a:srgbClr val="000000">
-                              <a:alpha val="100000"/>
-                            </a:srgbClr>
-                          </a:solidFill>
-                          <a:latin typeface="Source Sans Pro"/>
-                          <a:cs typeface="Source Sans Pro"/>
-                          <a:ea typeface="Source Sans Pro"/>
-                          <a:sym typeface="Source Sans Pro"/>
-                        </a:rPr>
                         <a:t>Average</a:t>
                       </a:r>
                     </a:p>
@@ -9985,7 +9985,7 @@
                   </a:tcPr>
                 </a:tc>
               </a:tr>
-              <a:tr h="353667">
+              <a:tr h="354101">
                 <a:tc>
                   <a:txBody>
                     <a:bodyPr/>
@@ -10871,7 +10871,7 @@
                   </a:tcPr>
                 </a:tc>
               </a:tr>
-              <a:tr h="353667">
+              <a:tr h="354721">
                 <a:tc>
                   <a:txBody>
                     <a:bodyPr/>
@@ -11300,7 +11300,7 @@
                   </a:tcPr>
                 </a:tc>
               </a:tr>
-              <a:tr h="378410">
+              <a:tr h="380270">
                 <a:tc>
                   <a:txBody>
                     <a:bodyPr/>
@@ -11729,7 +11729,7 @@
                   </a:tcPr>
                 </a:tc>
               </a:tr>
-              <a:tr h="378410">
+              <a:tr h="379960">
                 <a:tc>
                   <a:txBody>
                     <a:bodyPr/>
@@ -12158,7 +12158,7 @@
                   </a:tcPr>
                 </a:tc>
               </a:tr>
-              <a:tr h="353667">
+              <a:tr h="354101">
                 <a:tc>
                   <a:txBody>
                     <a:bodyPr/>
@@ -13044,7 +13044,7 @@
                   </a:tcPr>
                 </a:tc>
               </a:tr>
-              <a:tr h="353667">
+              <a:tr h="354411">
                 <a:tc>
                   <a:txBody>
                     <a:bodyPr/>
@@ -13473,7 +13473,7 @@
                   </a:tcPr>
                 </a:tc>
               </a:tr>
-              <a:tr h="353667">
+              <a:tr h="354535">
                 <a:tc>
                   <a:txBody>
                     <a:bodyPr/>
@@ -13902,7 +13902,7 @@
                   </a:tcPr>
                 </a:tc>
               </a:tr>
-              <a:tr h="378410">
+              <a:tr h="379960">
                 <a:tc>
                   <a:txBody>
                     <a:bodyPr/>
@@ -14331,7 +14331,7 @@
                   </a:tcPr>
                 </a:tc>
               </a:tr>
-              <a:tr h="353667">
+              <a:tr h="354101">
                 <a:tc>
                   <a:txBody>
                     <a:bodyPr/>

</xml_diff>